<commit_message>
update for read request in server
</commit_message>
<xml_diff>
--- a/curio_async/docs/Asyncio_in_alternative_reality.pptx
+++ b/curio_async/docs/Asyncio_in_alternative_reality.pptx
@@ -253,7 +253,7 @@
           <a:p>
             <a:fld id="{BC4A4BB2-ABFD-4252-BA4C-86E51B5768DF}" type="datetimeFigureOut">
               <a:rPr lang="en-GB" smtClean="0"/>
-              <a:t>08/05/2023</a:t>
+              <a:t>12/05/2023</a:t>
             </a:fld>
             <a:endParaRPr lang="en-GB"/>
           </a:p>
@@ -423,7 +423,7 @@
           <a:p>
             <a:fld id="{BC4A4BB2-ABFD-4252-BA4C-86E51B5768DF}" type="datetimeFigureOut">
               <a:rPr lang="en-GB" smtClean="0"/>
-              <a:t>08/05/2023</a:t>
+              <a:t>12/05/2023</a:t>
             </a:fld>
             <a:endParaRPr lang="en-GB"/>
           </a:p>
@@ -603,7 +603,7 @@
           <a:p>
             <a:fld id="{BC4A4BB2-ABFD-4252-BA4C-86E51B5768DF}" type="datetimeFigureOut">
               <a:rPr lang="en-GB" smtClean="0"/>
-              <a:t>08/05/2023</a:t>
+              <a:t>12/05/2023</a:t>
             </a:fld>
             <a:endParaRPr lang="en-GB"/>
           </a:p>
@@ -773,7 +773,7 @@
           <a:p>
             <a:fld id="{BC4A4BB2-ABFD-4252-BA4C-86E51B5768DF}" type="datetimeFigureOut">
               <a:rPr lang="en-GB" smtClean="0"/>
-              <a:t>08/05/2023</a:t>
+              <a:t>12/05/2023</a:t>
             </a:fld>
             <a:endParaRPr lang="en-GB"/>
           </a:p>
@@ -1019,7 +1019,7 @@
           <a:p>
             <a:fld id="{BC4A4BB2-ABFD-4252-BA4C-86E51B5768DF}" type="datetimeFigureOut">
               <a:rPr lang="en-GB" smtClean="0"/>
-              <a:t>08/05/2023</a:t>
+              <a:t>12/05/2023</a:t>
             </a:fld>
             <a:endParaRPr lang="en-GB"/>
           </a:p>
@@ -1251,7 +1251,7 @@
           <a:p>
             <a:fld id="{BC4A4BB2-ABFD-4252-BA4C-86E51B5768DF}" type="datetimeFigureOut">
               <a:rPr lang="en-GB" smtClean="0"/>
-              <a:t>08/05/2023</a:t>
+              <a:t>12/05/2023</a:t>
             </a:fld>
             <a:endParaRPr lang="en-GB"/>
           </a:p>
@@ -1618,7 +1618,7 @@
           <a:p>
             <a:fld id="{BC4A4BB2-ABFD-4252-BA4C-86E51B5768DF}" type="datetimeFigureOut">
               <a:rPr lang="en-GB" smtClean="0"/>
-              <a:t>08/05/2023</a:t>
+              <a:t>12/05/2023</a:t>
             </a:fld>
             <a:endParaRPr lang="en-GB"/>
           </a:p>
@@ -1736,7 +1736,7 @@
           <a:p>
             <a:fld id="{BC4A4BB2-ABFD-4252-BA4C-86E51B5768DF}" type="datetimeFigureOut">
               <a:rPr lang="en-GB" smtClean="0"/>
-              <a:t>08/05/2023</a:t>
+              <a:t>12/05/2023</a:t>
             </a:fld>
             <a:endParaRPr lang="en-GB"/>
           </a:p>
@@ -1831,7 +1831,7 @@
           <a:p>
             <a:fld id="{BC4A4BB2-ABFD-4252-BA4C-86E51B5768DF}" type="datetimeFigureOut">
               <a:rPr lang="en-GB" smtClean="0"/>
-              <a:t>08/05/2023</a:t>
+              <a:t>12/05/2023</a:t>
             </a:fld>
             <a:endParaRPr lang="en-GB"/>
           </a:p>
@@ -2108,7 +2108,7 @@
           <a:p>
             <a:fld id="{BC4A4BB2-ABFD-4252-BA4C-86E51B5768DF}" type="datetimeFigureOut">
               <a:rPr lang="en-GB" smtClean="0"/>
-              <a:t>08/05/2023</a:t>
+              <a:t>12/05/2023</a:t>
             </a:fld>
             <a:endParaRPr lang="en-GB"/>
           </a:p>
@@ -2361,7 +2361,7 @@
           <a:p>
             <a:fld id="{BC4A4BB2-ABFD-4252-BA4C-86E51B5768DF}" type="datetimeFigureOut">
               <a:rPr lang="en-GB" smtClean="0"/>
-              <a:t>08/05/2023</a:t>
+              <a:t>12/05/2023</a:t>
             </a:fld>
             <a:endParaRPr lang="en-GB"/>
           </a:p>
@@ -2574,7 +2574,7 @@
           <a:p>
             <a:fld id="{BC4A4BB2-ABFD-4252-BA4C-86E51B5768DF}" type="datetimeFigureOut">
               <a:rPr lang="en-GB" smtClean="0"/>
-              <a:t>08/05/2023</a:t>
+              <a:t>12/05/2023</a:t>
             </a:fld>
             <a:endParaRPr lang="en-GB"/>
           </a:p>
@@ -2989,7 +2989,12 @@
             <p:ph type="ctrTitle"/>
           </p:nvPr>
         </p:nvSpPr>
-        <p:spPr/>
+        <p:spPr>
+          <a:xfrm>
+            <a:off x="1524000" y="1122363"/>
+            <a:ext cx="7293429" cy="2387600"/>
+          </a:xfrm>
+        </p:spPr>
         <p:txBody>
           <a:bodyPr>
             <a:normAutofit fontScale="90000"/>
@@ -3024,7 +3029,7 @@
         </p:nvSpPr>
         <p:spPr>
           <a:xfrm>
-            <a:off x="1390650" y="3754438"/>
+            <a:off x="1390649" y="4325938"/>
             <a:ext cx="9144000" cy="1655762"/>
           </a:xfrm>
         </p:spPr>
@@ -3066,6 +3071,36 @@
           </a:p>
         </p:txBody>
       </p:sp>
+      <p:pic>
+        <p:nvPicPr>
+          <p:cNvPr id="4" name="Picture 3"/>
+          <p:cNvPicPr>
+            <a:picLocks noChangeAspect="1"/>
+          </p:cNvPicPr>
+          <p:nvPr/>
+        </p:nvPicPr>
+        <p:blipFill>
+          <a:blip r:embed="rId2" cstate="print">
+            <a:extLst>
+              <a:ext uri="{28A0092B-C50C-407E-A947-70E740481C1C}">
+                <a14:useLocalDpi xmlns:a14="http://schemas.microsoft.com/office/drawing/2010/main" val="0"/>
+              </a:ext>
+            </a:extLst>
+          </a:blip>
+          <a:stretch>
+            <a:fillRect/>
+          </a:stretch>
+        </p:blipFill>
+        <p:spPr>
+          <a:xfrm>
+            <a:off x="8817429" y="756558"/>
+            <a:ext cx="2998397" cy="2998397"/>
+          </a:xfrm>
+          <a:prstGeom prst="rect">
+            <a:avLst/>
+          </a:prstGeom>
+        </p:spPr>
+      </p:pic>
     </p:spTree>
     <p:extLst>
       <p:ext uri="{BB962C8B-B14F-4D97-AF65-F5344CB8AC3E}">
@@ -3076,6 +3111,13 @@
   <p:clrMapOvr>
     <a:masterClrMapping/>
   </p:clrMapOvr>
+  <p:timing>
+    <p:tnLst>
+      <p:par>
+        <p:cTn id="1" dur="indefinite" restart="never" nodeType="tmRoot"/>
+      </p:par>
+    </p:tnLst>
+  </p:timing>
 </p:sld>
 </file>
 
@@ -3196,7 +3238,6 @@
               <a:rPr lang="en-GB" u="sng" dirty="0"/>
               <a:t>- 0.16</a:t>
             </a:r>
-            <a:endParaRPr lang="en-GB" u="sng" dirty="0"/>
           </a:p>
         </p:txBody>
       </p:sp>
@@ -3210,6 +3251,13 @@
   <p:clrMapOvr>
     <a:masterClrMapping/>
   </p:clrMapOvr>
+  <p:timing>
+    <p:tnLst>
+      <p:par>
+        <p:cTn id="1" dur="indefinite" restart="never" nodeType="tmRoot"/>
+      </p:par>
+    </p:tnLst>
+  </p:timing>
 </p:sld>
 </file>
 
@@ -3466,6 +3514,13 @@
   <p:clrMapOvr>
     <a:masterClrMapping/>
   </p:clrMapOvr>
+  <p:timing>
+    <p:tnLst>
+      <p:par>
+        <p:cTn id="1" dur="indefinite" restart="never" nodeType="tmRoot"/>
+      </p:par>
+    </p:tnLst>
+  </p:timing>
 </p:sld>
 </file>
 
@@ -3566,6 +3621,13 @@
   <p:clrMapOvr>
     <a:masterClrMapping/>
   </p:clrMapOvr>
+  <p:timing>
+    <p:tnLst>
+      <p:par>
+        <p:cTn id="1" dur="indefinite" restart="never" nodeType="tmRoot"/>
+      </p:par>
+    </p:tnLst>
+  </p:timing>
 </p:sld>
 </file>
 
@@ -3734,6 +3796,13 @@
   <p:clrMapOvr>
     <a:masterClrMapping/>
   </p:clrMapOvr>
+  <p:timing>
+    <p:tnLst>
+      <p:par>
+        <p:cTn id="1" dur="indefinite" restart="never" nodeType="tmRoot"/>
+      </p:par>
+    </p:tnLst>
+  </p:timing>
 </p:sld>
 </file>
 
@@ -3934,6 +4003,13 @@
   <p:clrMapOvr>
     <a:masterClrMapping/>
   </p:clrMapOvr>
+  <p:timing>
+    <p:tnLst>
+      <p:par>
+        <p:cTn id="1" dur="indefinite" restart="never" nodeType="tmRoot"/>
+      </p:par>
+    </p:tnLst>
+  </p:timing>
 </p:sld>
 </file>
 
@@ -4065,6 +4141,13 @@
   <p:clrMapOvr>
     <a:masterClrMapping/>
   </p:clrMapOvr>
+  <p:timing>
+    <p:tnLst>
+      <p:par>
+        <p:cTn id="1" dur="indefinite" restart="never" nodeType="tmRoot"/>
+      </p:par>
+    </p:tnLst>
+  </p:timing>
 </p:sld>
 </file>
 
@@ -4190,6 +4273,13 @@
   <p:clrMapOvr>
     <a:masterClrMapping/>
   </p:clrMapOvr>
+  <p:timing>
+    <p:tnLst>
+      <p:par>
+        <p:cTn id="1" dur="indefinite" restart="never" nodeType="tmRoot"/>
+      </p:par>
+    </p:tnLst>
+  </p:timing>
 </p:sld>
 </file>
 
@@ -4284,7 +4374,6 @@
               <a:rPr lang="de-AT" dirty="0" smtClean="0"/>
               <a:t> ?</a:t>
             </a:r>
-            <a:endParaRPr lang="de-AT" dirty="0" smtClean="0"/>
           </a:p>
           <a:p>
             <a:pPr marL="0" indent="0">
@@ -4297,7 +4386,6 @@
               <a:rPr lang="de-AT" dirty="0" smtClean="0"/>
               <a:t>Trio ??</a:t>
             </a:r>
-            <a:endParaRPr lang="de-AT" dirty="0" smtClean="0"/>
           </a:p>
           <a:p>
             <a:endParaRPr lang="de-AT" dirty="0"/>
@@ -4334,6 +4422,13 @@
   <p:clrMapOvr>
     <a:masterClrMapping/>
   </p:clrMapOvr>
+  <p:timing>
+    <p:tnLst>
+      <p:par>
+        <p:cTn id="1" dur="indefinite" restart="never" nodeType="tmRoot"/>
+      </p:par>
+    </p:tnLst>
+  </p:timing>
 </p:sld>
 </file>
 
@@ -4438,6 +4533,13 @@
   <p:clrMapOvr>
     <a:masterClrMapping/>
   </p:clrMapOvr>
+  <p:timing>
+    <p:tnLst>
+      <p:par>
+        <p:cTn id="1" dur="indefinite" restart="never" nodeType="tmRoot"/>
+      </p:par>
+    </p:tnLst>
+  </p:timing>
 </p:sld>
 </file>
 

</xml_diff>

<commit_message>
update 3 parth - servers
</commit_message>
<xml_diff>
--- a/curio_async/docs/Asyncio_in_alternative_reality.pptx
+++ b/curio_async/docs/Asyncio_in_alternative_reality.pptx
@@ -16,6 +16,7 @@
     <p:sldId id="264" r:id="rId10"/>
     <p:sldId id="265" r:id="rId11"/>
     <p:sldId id="266" r:id="rId12"/>
+    <p:sldId id="267" r:id="rId13"/>
   </p:sldIdLst>
   <p:sldSz cx="12192000" cy="6858000"/>
   <p:notesSz cx="6858000" cy="9144000"/>
@@ -253,7 +254,7 @@
           <a:p>
             <a:fld id="{BC4A4BB2-ABFD-4252-BA4C-86E51B5768DF}" type="datetimeFigureOut">
               <a:rPr lang="en-GB" smtClean="0"/>
-              <a:t>12/05/2023</a:t>
+              <a:t>18/05/2023</a:t>
             </a:fld>
             <a:endParaRPr lang="en-GB"/>
           </a:p>
@@ -423,7 +424,7 @@
           <a:p>
             <a:fld id="{BC4A4BB2-ABFD-4252-BA4C-86E51B5768DF}" type="datetimeFigureOut">
               <a:rPr lang="en-GB" smtClean="0"/>
-              <a:t>12/05/2023</a:t>
+              <a:t>18/05/2023</a:t>
             </a:fld>
             <a:endParaRPr lang="en-GB"/>
           </a:p>
@@ -603,7 +604,7 @@
           <a:p>
             <a:fld id="{BC4A4BB2-ABFD-4252-BA4C-86E51B5768DF}" type="datetimeFigureOut">
               <a:rPr lang="en-GB" smtClean="0"/>
-              <a:t>12/05/2023</a:t>
+              <a:t>18/05/2023</a:t>
             </a:fld>
             <a:endParaRPr lang="en-GB"/>
           </a:p>
@@ -773,7 +774,7 @@
           <a:p>
             <a:fld id="{BC4A4BB2-ABFD-4252-BA4C-86E51B5768DF}" type="datetimeFigureOut">
               <a:rPr lang="en-GB" smtClean="0"/>
-              <a:t>12/05/2023</a:t>
+              <a:t>18/05/2023</a:t>
             </a:fld>
             <a:endParaRPr lang="en-GB"/>
           </a:p>
@@ -1019,7 +1020,7 @@
           <a:p>
             <a:fld id="{BC4A4BB2-ABFD-4252-BA4C-86E51B5768DF}" type="datetimeFigureOut">
               <a:rPr lang="en-GB" smtClean="0"/>
-              <a:t>12/05/2023</a:t>
+              <a:t>18/05/2023</a:t>
             </a:fld>
             <a:endParaRPr lang="en-GB"/>
           </a:p>
@@ -1251,7 +1252,7 @@
           <a:p>
             <a:fld id="{BC4A4BB2-ABFD-4252-BA4C-86E51B5768DF}" type="datetimeFigureOut">
               <a:rPr lang="en-GB" smtClean="0"/>
-              <a:t>12/05/2023</a:t>
+              <a:t>18/05/2023</a:t>
             </a:fld>
             <a:endParaRPr lang="en-GB"/>
           </a:p>
@@ -1618,7 +1619,7 @@
           <a:p>
             <a:fld id="{BC4A4BB2-ABFD-4252-BA4C-86E51B5768DF}" type="datetimeFigureOut">
               <a:rPr lang="en-GB" smtClean="0"/>
-              <a:t>12/05/2023</a:t>
+              <a:t>18/05/2023</a:t>
             </a:fld>
             <a:endParaRPr lang="en-GB"/>
           </a:p>
@@ -1736,7 +1737,7 @@
           <a:p>
             <a:fld id="{BC4A4BB2-ABFD-4252-BA4C-86E51B5768DF}" type="datetimeFigureOut">
               <a:rPr lang="en-GB" smtClean="0"/>
-              <a:t>12/05/2023</a:t>
+              <a:t>18/05/2023</a:t>
             </a:fld>
             <a:endParaRPr lang="en-GB"/>
           </a:p>
@@ -1831,7 +1832,7 @@
           <a:p>
             <a:fld id="{BC4A4BB2-ABFD-4252-BA4C-86E51B5768DF}" type="datetimeFigureOut">
               <a:rPr lang="en-GB" smtClean="0"/>
-              <a:t>12/05/2023</a:t>
+              <a:t>18/05/2023</a:t>
             </a:fld>
             <a:endParaRPr lang="en-GB"/>
           </a:p>
@@ -2108,7 +2109,7 @@
           <a:p>
             <a:fld id="{BC4A4BB2-ABFD-4252-BA4C-86E51B5768DF}" type="datetimeFigureOut">
               <a:rPr lang="en-GB" smtClean="0"/>
-              <a:t>12/05/2023</a:t>
+              <a:t>18/05/2023</a:t>
             </a:fld>
             <a:endParaRPr lang="en-GB"/>
           </a:p>
@@ -2361,7 +2362,7 @@
           <a:p>
             <a:fld id="{BC4A4BB2-ABFD-4252-BA4C-86E51B5768DF}" type="datetimeFigureOut">
               <a:rPr lang="en-GB" smtClean="0"/>
-              <a:t>12/05/2023</a:t>
+              <a:t>18/05/2023</a:t>
             </a:fld>
             <a:endParaRPr lang="en-GB"/>
           </a:p>
@@ -2574,7 +2575,7 @@
           <a:p>
             <a:fld id="{BC4A4BB2-ABFD-4252-BA4C-86E51B5768DF}" type="datetimeFigureOut">
               <a:rPr lang="en-GB" smtClean="0"/>
-              <a:t>12/05/2023</a:t>
+              <a:t>18/05/2023</a:t>
             </a:fld>
             <a:endParaRPr lang="en-GB"/>
           </a:p>
@@ -3295,7 +3296,19 @@
           <a:p>
             <a:r>
               <a:rPr lang="en-GB" dirty="0" smtClean="0"/>
-              <a:t>TCP server file read and send answer</a:t>
+              <a:t>TCP </a:t>
+            </a:r>
+            <a:r>
+              <a:rPr lang="en-GB" dirty="0"/>
+              <a:t>server </a:t>
+            </a:r>
+            <a:r>
+              <a:rPr lang="en-GB" dirty="0" smtClean="0"/>
+              <a:t>get request and send </a:t>
+            </a:r>
+            <a:r>
+              <a:rPr lang="en-GB" dirty="0" smtClean="0"/>
+              <a:t>response</a:t>
             </a:r>
             <a:endParaRPr lang="en-GB" dirty="0"/>
           </a:p>
@@ -3318,8 +3331,55 @@
           <a:p>
             <a:r>
               <a:rPr lang="en-GB" dirty="0"/>
-              <a:t>3_curio_server.py</a:t>
-            </a:r>
+              <a:t>python </a:t>
+            </a:r>
+            <a:r>
+              <a:rPr lang="en-GB" dirty="0" smtClean="0"/>
+              <a:t>3_syncfile.py echo "hello world"</a:t>
+            </a:r>
+          </a:p>
+          <a:p>
+            <a:endParaRPr lang="en-GB" dirty="0"/>
+          </a:p>
+          <a:p>
+            <a:r>
+              <a:rPr lang="en-GB" dirty="0"/>
+              <a:t>python </a:t>
+            </a:r>
+            <a:r>
+              <a:rPr lang="en-GB" dirty="0" smtClean="0"/>
+              <a:t>3_aiohttp_server.py echo</a:t>
+            </a:r>
+            <a:r>
+              <a:rPr lang="en-GB" dirty="0"/>
+              <a:t> "hello world</a:t>
+            </a:r>
+            <a:r>
+              <a:rPr lang="en-GB" dirty="0" smtClean="0"/>
+              <a:t>"</a:t>
+            </a:r>
+          </a:p>
+          <a:p>
+            <a:endParaRPr lang="en-GB" dirty="0"/>
+          </a:p>
+          <a:p>
+            <a:r>
+              <a:rPr lang="en-GB" dirty="0" smtClean="0"/>
+              <a:t>python </a:t>
+            </a:r>
+            <a:r>
+              <a:rPr lang="en-GB" dirty="0"/>
+              <a:t>3_curio_server.py echo "hello world"</a:t>
+            </a:r>
+          </a:p>
+          <a:p>
+            <a:pPr marL="0" indent="0">
+              <a:buNone/>
+            </a:pPr>
+            <a:endParaRPr lang="en-GB" dirty="0" smtClean="0"/>
+          </a:p>
+          <a:p>
+            <a:endParaRPr lang="en-GB" dirty="0"/>
           </a:p>
         </p:txBody>
       </p:sp>
@@ -3333,6 +3393,152 @@
   <p:clrMapOvr>
     <a:masterClrMapping/>
   </p:clrMapOvr>
+  <p:timing>
+    <p:tnLst>
+      <p:par>
+        <p:cTn id="1" dur="indefinite" restart="never" nodeType="tmRoot"/>
+      </p:par>
+    </p:tnLst>
+  </p:timing>
+</p:sld>
+</file>
+
+<file path=ppt/slides/slide12.xml><?xml version="1.0" encoding="utf-8"?>
+<p:sld xmlns:a="http://schemas.openxmlformats.org/drawingml/2006/main" xmlns:r="http://schemas.openxmlformats.org/officeDocument/2006/relationships" xmlns:p="http://schemas.openxmlformats.org/presentationml/2006/main">
+  <p:cSld>
+    <p:spTree>
+      <p:nvGrpSpPr>
+        <p:cNvPr id="1" name=""/>
+        <p:cNvGrpSpPr/>
+        <p:nvPr/>
+      </p:nvGrpSpPr>
+      <p:grpSpPr>
+        <a:xfrm>
+          <a:off x="0" y="0"/>
+          <a:ext cx="0" cy="0"/>
+          <a:chOff x="0" y="0"/>
+          <a:chExt cx="0" cy="0"/>
+        </a:xfrm>
+      </p:grpSpPr>
+      <p:sp>
+        <p:nvSpPr>
+          <p:cNvPr id="2" name="Title 1"/>
+          <p:cNvSpPr>
+            <a:spLocks noGrp="1"/>
+          </p:cNvSpPr>
+          <p:nvPr>
+            <p:ph type="title"/>
+          </p:nvPr>
+        </p:nvSpPr>
+        <p:spPr/>
+        <p:txBody>
+          <a:bodyPr/>
+          <a:lstStyle/>
+          <a:p>
+            <a:r>
+              <a:rPr lang="en-GB" dirty="0" smtClean="0"/>
+              <a:t>TCP server read and send answer</a:t>
+            </a:r>
+            <a:endParaRPr lang="en-GB" dirty="0"/>
+          </a:p>
+        </p:txBody>
+      </p:sp>
+      <p:sp>
+        <p:nvSpPr>
+          <p:cNvPr id="3" name="Content Placeholder 2"/>
+          <p:cNvSpPr>
+            <a:spLocks noGrp="1"/>
+          </p:cNvSpPr>
+          <p:nvPr>
+            <p:ph idx="1"/>
+          </p:nvPr>
+        </p:nvSpPr>
+        <p:spPr/>
+        <p:txBody>
+          <a:bodyPr/>
+          <a:lstStyle/>
+          <a:p>
+            <a:r>
+              <a:rPr lang="en-GB" dirty="0"/>
+              <a:t>python </a:t>
+            </a:r>
+            <a:r>
+              <a:rPr lang="en-GB" dirty="0" smtClean="0"/>
+              <a:t>3_syncfile.py </a:t>
+            </a:r>
+            <a:r>
+              <a:rPr lang="en-GB" dirty="0"/>
+              <a:t>hello world - </a:t>
+            </a:r>
+            <a:r>
+              <a:rPr lang="en-GB" dirty="0" smtClean="0"/>
+              <a:t>~70rps</a:t>
+            </a:r>
+            <a:endParaRPr lang="en-GB" dirty="0"/>
+          </a:p>
+          <a:p>
+            <a:endParaRPr lang="en-GB" dirty="0"/>
+          </a:p>
+          <a:p>
+            <a:r>
+              <a:rPr lang="en-GB" dirty="0"/>
+              <a:t>python </a:t>
+            </a:r>
+            <a:r>
+              <a:rPr lang="en-GB" dirty="0" smtClean="0"/>
+              <a:t>3_aiohttp_server.py hello world - ~900rps</a:t>
+            </a:r>
+            <a:endParaRPr lang="en-GB" dirty="0"/>
+          </a:p>
+          <a:p>
+            <a:pPr marL="0" indent="0">
+              <a:buNone/>
+            </a:pPr>
+            <a:endParaRPr lang="en-GB" dirty="0"/>
+          </a:p>
+          <a:p>
+            <a:r>
+              <a:rPr lang="en-GB" dirty="0" smtClean="0"/>
+              <a:t>python 3_curio_server.py </a:t>
+            </a:r>
+            <a:r>
+              <a:rPr lang="en-GB" dirty="0"/>
+              <a:t>hello world - </a:t>
+            </a:r>
+            <a:r>
+              <a:rPr lang="en-GB" dirty="0" smtClean="0"/>
+              <a:t>~2500rps</a:t>
+            </a:r>
+            <a:endParaRPr lang="en-GB" dirty="0"/>
+          </a:p>
+          <a:p>
+            <a:pPr marL="0" indent="0">
+              <a:buNone/>
+            </a:pPr>
+            <a:endParaRPr lang="en-GB" dirty="0" smtClean="0"/>
+          </a:p>
+          <a:p>
+            <a:endParaRPr lang="en-GB" dirty="0"/>
+          </a:p>
+        </p:txBody>
+      </p:sp>
+    </p:spTree>
+    <p:extLst>
+      <p:ext uri="{BB962C8B-B14F-4D97-AF65-F5344CB8AC3E}">
+        <p14:creationId xmlns:p14="http://schemas.microsoft.com/office/powerpoint/2010/main" val="2007810665"/>
+      </p:ext>
+    </p:extLst>
+  </p:cSld>
+  <p:clrMapOvr>
+    <a:masterClrMapping/>
+  </p:clrMapOvr>
+  <p:timing>
+    <p:tnLst>
+      <p:par>
+        <p:cTn id="1" dur="indefinite" restart="never" nodeType="tmRoot"/>
+      </p:par>
+    </p:tnLst>
+  </p:timing>
 </p:sld>
 </file>
 

</xml_diff>

<commit_message>
compile all in 4 step
</commit_message>
<xml_diff>
--- a/curio_async/docs/Asyncio_in_alternative_reality.pptx
+++ b/curio_async/docs/Asyncio_in_alternative_reality.pptx
@@ -17,6 +17,8 @@
     <p:sldId id="265" r:id="rId11"/>
     <p:sldId id="266" r:id="rId12"/>
     <p:sldId id="267" r:id="rId13"/>
+    <p:sldId id="268" r:id="rId14"/>
+    <p:sldId id="269" r:id="rId15"/>
   </p:sldIdLst>
   <p:sldSz cx="12192000" cy="6858000"/>
   <p:notesSz cx="6858000" cy="9144000"/>
@@ -254,7 +256,7 @@
           <a:p>
             <a:fld id="{BC4A4BB2-ABFD-4252-BA4C-86E51B5768DF}" type="datetimeFigureOut">
               <a:rPr lang="en-GB" smtClean="0"/>
-              <a:t>18/05/2023</a:t>
+              <a:t>21/05/2023</a:t>
             </a:fld>
             <a:endParaRPr lang="en-GB"/>
           </a:p>
@@ -424,7 +426,7 @@
           <a:p>
             <a:fld id="{BC4A4BB2-ABFD-4252-BA4C-86E51B5768DF}" type="datetimeFigureOut">
               <a:rPr lang="en-GB" smtClean="0"/>
-              <a:t>18/05/2023</a:t>
+              <a:t>21/05/2023</a:t>
             </a:fld>
             <a:endParaRPr lang="en-GB"/>
           </a:p>
@@ -604,7 +606,7 @@
           <a:p>
             <a:fld id="{BC4A4BB2-ABFD-4252-BA4C-86E51B5768DF}" type="datetimeFigureOut">
               <a:rPr lang="en-GB" smtClean="0"/>
-              <a:t>18/05/2023</a:t>
+              <a:t>21/05/2023</a:t>
             </a:fld>
             <a:endParaRPr lang="en-GB"/>
           </a:p>
@@ -774,7 +776,7 @@
           <a:p>
             <a:fld id="{BC4A4BB2-ABFD-4252-BA4C-86E51B5768DF}" type="datetimeFigureOut">
               <a:rPr lang="en-GB" smtClean="0"/>
-              <a:t>18/05/2023</a:t>
+              <a:t>21/05/2023</a:t>
             </a:fld>
             <a:endParaRPr lang="en-GB"/>
           </a:p>
@@ -1020,7 +1022,7 @@
           <a:p>
             <a:fld id="{BC4A4BB2-ABFD-4252-BA4C-86E51B5768DF}" type="datetimeFigureOut">
               <a:rPr lang="en-GB" smtClean="0"/>
-              <a:t>18/05/2023</a:t>
+              <a:t>21/05/2023</a:t>
             </a:fld>
             <a:endParaRPr lang="en-GB"/>
           </a:p>
@@ -1252,7 +1254,7 @@
           <a:p>
             <a:fld id="{BC4A4BB2-ABFD-4252-BA4C-86E51B5768DF}" type="datetimeFigureOut">
               <a:rPr lang="en-GB" smtClean="0"/>
-              <a:t>18/05/2023</a:t>
+              <a:t>21/05/2023</a:t>
             </a:fld>
             <a:endParaRPr lang="en-GB"/>
           </a:p>
@@ -1619,7 +1621,7 @@
           <a:p>
             <a:fld id="{BC4A4BB2-ABFD-4252-BA4C-86E51B5768DF}" type="datetimeFigureOut">
               <a:rPr lang="en-GB" smtClean="0"/>
-              <a:t>18/05/2023</a:t>
+              <a:t>21/05/2023</a:t>
             </a:fld>
             <a:endParaRPr lang="en-GB"/>
           </a:p>
@@ -1737,7 +1739,7 @@
           <a:p>
             <a:fld id="{BC4A4BB2-ABFD-4252-BA4C-86E51B5768DF}" type="datetimeFigureOut">
               <a:rPr lang="en-GB" smtClean="0"/>
-              <a:t>18/05/2023</a:t>
+              <a:t>21/05/2023</a:t>
             </a:fld>
             <a:endParaRPr lang="en-GB"/>
           </a:p>
@@ -1832,7 +1834,7 @@
           <a:p>
             <a:fld id="{BC4A4BB2-ABFD-4252-BA4C-86E51B5768DF}" type="datetimeFigureOut">
               <a:rPr lang="en-GB" smtClean="0"/>
-              <a:t>18/05/2023</a:t>
+              <a:t>21/05/2023</a:t>
             </a:fld>
             <a:endParaRPr lang="en-GB"/>
           </a:p>
@@ -2109,7 +2111,7 @@
           <a:p>
             <a:fld id="{BC4A4BB2-ABFD-4252-BA4C-86E51B5768DF}" type="datetimeFigureOut">
               <a:rPr lang="en-GB" smtClean="0"/>
-              <a:t>18/05/2023</a:t>
+              <a:t>21/05/2023</a:t>
             </a:fld>
             <a:endParaRPr lang="en-GB"/>
           </a:p>
@@ -2362,7 +2364,7 @@
           <a:p>
             <a:fld id="{BC4A4BB2-ABFD-4252-BA4C-86E51B5768DF}" type="datetimeFigureOut">
               <a:rPr lang="en-GB" smtClean="0"/>
-              <a:t>18/05/2023</a:t>
+              <a:t>21/05/2023</a:t>
             </a:fld>
             <a:endParaRPr lang="en-GB"/>
           </a:p>
@@ -2575,7 +2577,7 @@
           <a:p>
             <a:fld id="{BC4A4BB2-ABFD-4252-BA4C-86E51B5768DF}" type="datetimeFigureOut">
               <a:rPr lang="en-GB" smtClean="0"/>
-              <a:t>18/05/2023</a:t>
+              <a:t>21/05/2023</a:t>
             </a:fld>
             <a:endParaRPr lang="en-GB"/>
           </a:p>
@@ -3304,11 +3306,7 @@
             </a:r>
             <a:r>
               <a:rPr lang="en-GB" dirty="0" smtClean="0"/>
-              <a:t>get request and send </a:t>
-            </a:r>
-            <a:r>
-              <a:rPr lang="en-GB" dirty="0" smtClean="0"/>
-              <a:t>response</a:t>
+              <a:t>get request and send response</a:t>
             </a:r>
             <a:endParaRPr lang="en-GB" dirty="0"/>
           </a:p>
@@ -3526,6 +3524,929 @@
     <p:extLst>
       <p:ext uri="{BB962C8B-B14F-4D97-AF65-F5344CB8AC3E}">
         <p14:creationId xmlns:p14="http://schemas.microsoft.com/office/powerpoint/2010/main" val="2007810665"/>
+      </p:ext>
+    </p:extLst>
+  </p:cSld>
+  <p:clrMapOvr>
+    <a:masterClrMapping/>
+  </p:clrMapOvr>
+  <p:timing>
+    <p:tnLst>
+      <p:par>
+        <p:cTn id="1" dur="indefinite" restart="never" nodeType="tmRoot"/>
+      </p:par>
+    </p:tnLst>
+  </p:timing>
+</p:sld>
+</file>
+
+<file path=ppt/slides/slide13.xml><?xml version="1.0" encoding="utf-8"?>
+<p:sld xmlns:a="http://schemas.openxmlformats.org/drawingml/2006/main" xmlns:r="http://schemas.openxmlformats.org/officeDocument/2006/relationships" xmlns:p="http://schemas.openxmlformats.org/presentationml/2006/main">
+  <p:cSld>
+    <p:spTree>
+      <p:nvGrpSpPr>
+        <p:cNvPr id="1" name=""/>
+        <p:cNvGrpSpPr/>
+        <p:nvPr/>
+      </p:nvGrpSpPr>
+      <p:grpSpPr>
+        <a:xfrm>
+          <a:off x="0" y="0"/>
+          <a:ext cx="0" cy="0"/>
+          <a:chOff x="0" y="0"/>
+          <a:chExt cx="0" cy="0"/>
+        </a:xfrm>
+      </p:grpSpPr>
+      <p:sp>
+        <p:nvSpPr>
+          <p:cNvPr id="2" name="Title 1"/>
+          <p:cNvSpPr>
+            <a:spLocks noGrp="1"/>
+          </p:cNvSpPr>
+          <p:nvPr>
+            <p:ph type="title"/>
+          </p:nvPr>
+        </p:nvSpPr>
+        <p:spPr/>
+        <p:txBody>
+          <a:bodyPr/>
+          <a:lstStyle/>
+          <a:p>
+            <a:r>
+              <a:rPr lang="en-GB" dirty="0"/>
+              <a:t>Micro service read, </a:t>
+            </a:r>
+            <a:r>
+              <a:rPr lang="de-AT" dirty="0" err="1"/>
+              <a:t>render</a:t>
+            </a:r>
+            <a:r>
+              <a:rPr lang="de-AT" dirty="0"/>
+              <a:t> </a:t>
+            </a:r>
+            <a:r>
+              <a:rPr lang="en-GB" dirty="0"/>
+              <a:t>and send answer</a:t>
+            </a:r>
+          </a:p>
+        </p:txBody>
+      </p:sp>
+      <p:sp>
+        <p:nvSpPr>
+          <p:cNvPr id="3" name="Content Placeholder 2"/>
+          <p:cNvSpPr>
+            <a:spLocks noGrp="1"/>
+          </p:cNvSpPr>
+          <p:nvPr>
+            <p:ph idx="1"/>
+          </p:nvPr>
+        </p:nvSpPr>
+        <p:spPr/>
+        <p:txBody>
+          <a:bodyPr/>
+          <a:lstStyle/>
+          <a:p>
+            <a:r>
+              <a:rPr lang="de-AT" dirty="0" smtClean="0"/>
+              <a:t> </a:t>
+            </a:r>
+            <a:endParaRPr lang="en-GB" dirty="0"/>
+          </a:p>
+        </p:txBody>
+      </p:sp>
+      <p:sp>
+        <p:nvSpPr>
+          <p:cNvPr id="4" name="Rectangle 3"/>
+          <p:cNvSpPr/>
+          <p:nvPr/>
+        </p:nvSpPr>
+        <p:spPr>
+          <a:xfrm>
+            <a:off x="2846566" y="2417564"/>
+            <a:ext cx="1796995" cy="914400"/>
+          </a:xfrm>
+          <a:prstGeom prst="rect">
+            <a:avLst/>
+          </a:prstGeom>
+        </p:spPr>
+        <p:style>
+          <a:lnRef idx="2">
+            <a:schemeClr val="accent1">
+              <a:shade val="50000"/>
+            </a:schemeClr>
+          </a:lnRef>
+          <a:fillRef idx="1">
+            <a:schemeClr val="accent1"/>
+          </a:fillRef>
+          <a:effectRef idx="0">
+            <a:schemeClr val="accent1"/>
+          </a:effectRef>
+          <a:fontRef idx="minor">
+            <a:schemeClr val="lt1"/>
+          </a:fontRef>
+        </p:style>
+        <p:txBody>
+          <a:bodyPr rtlCol="0" anchor="ctr"/>
+          <a:lstStyle/>
+          <a:p>
+            <a:pPr algn="ctr"/>
+            <a:r>
+              <a:rPr lang="de-AT" dirty="0" smtClean="0"/>
+              <a:t>Read </a:t>
+            </a:r>
+            <a:r>
+              <a:rPr lang="de-AT" dirty="0" err="1" smtClean="0"/>
+              <a:t>request</a:t>
+            </a:r>
+            <a:r>
+              <a:rPr lang="de-AT" dirty="0" smtClean="0"/>
+              <a:t> </a:t>
+            </a:r>
+            <a:r>
+              <a:rPr lang="de-AT" dirty="0" err="1" smtClean="0"/>
+              <a:t>data</a:t>
+            </a:r>
+            <a:endParaRPr lang="de-AT" dirty="0" smtClean="0"/>
+          </a:p>
+          <a:p>
+            <a:pPr algn="ctr"/>
+            <a:r>
+              <a:rPr lang="de-AT" dirty="0" smtClean="0"/>
+              <a:t>IO </a:t>
+            </a:r>
+            <a:r>
+              <a:rPr lang="de-AT" dirty="0" err="1" smtClean="0"/>
+              <a:t>bounded</a:t>
+            </a:r>
+            <a:endParaRPr lang="en-GB" dirty="0"/>
+          </a:p>
+        </p:txBody>
+      </p:sp>
+      <p:sp>
+        <p:nvSpPr>
+          <p:cNvPr id="5" name="Rectangle 4"/>
+          <p:cNvSpPr/>
+          <p:nvPr/>
+        </p:nvSpPr>
+        <p:spPr>
+          <a:xfrm>
+            <a:off x="8977021" y="2560320"/>
+            <a:ext cx="1796995" cy="914400"/>
+          </a:xfrm>
+          <a:prstGeom prst="rect">
+            <a:avLst/>
+          </a:prstGeom>
+        </p:spPr>
+        <p:style>
+          <a:lnRef idx="2">
+            <a:schemeClr val="accent1">
+              <a:shade val="50000"/>
+            </a:schemeClr>
+          </a:lnRef>
+          <a:fillRef idx="1">
+            <a:schemeClr val="accent1"/>
+          </a:fillRef>
+          <a:effectRef idx="0">
+            <a:schemeClr val="accent1"/>
+          </a:effectRef>
+          <a:fontRef idx="minor">
+            <a:schemeClr val="lt1"/>
+          </a:fontRef>
+        </p:style>
+        <p:txBody>
+          <a:bodyPr rtlCol="0" anchor="ctr"/>
+          <a:lstStyle/>
+          <a:p>
+            <a:pPr algn="ctr"/>
+            <a:r>
+              <a:rPr lang="de-AT" dirty="0" smtClean="0"/>
+              <a:t>Read </a:t>
+            </a:r>
+            <a:r>
+              <a:rPr lang="de-AT" dirty="0" err="1" smtClean="0"/>
+              <a:t>templates</a:t>
+            </a:r>
+            <a:endParaRPr lang="de-AT" dirty="0" smtClean="0"/>
+          </a:p>
+          <a:p>
+            <a:pPr algn="ctr"/>
+            <a:r>
+              <a:rPr lang="de-AT" dirty="0" smtClean="0"/>
+              <a:t>IO </a:t>
+            </a:r>
+            <a:r>
+              <a:rPr lang="de-AT" dirty="0" err="1" smtClean="0"/>
+              <a:t>bounded</a:t>
+            </a:r>
+            <a:endParaRPr lang="en-GB" dirty="0"/>
+          </a:p>
+        </p:txBody>
+      </p:sp>
+      <p:sp>
+        <p:nvSpPr>
+          <p:cNvPr id="6" name="Rectangle 5"/>
+          <p:cNvSpPr/>
+          <p:nvPr/>
+        </p:nvSpPr>
+        <p:spPr>
+          <a:xfrm>
+            <a:off x="8977021" y="3819237"/>
+            <a:ext cx="1796995" cy="914400"/>
+          </a:xfrm>
+          <a:prstGeom prst="rect">
+            <a:avLst/>
+          </a:prstGeom>
+          <a:solidFill>
+            <a:schemeClr val="bg1">
+              <a:lumMod val="85000"/>
+            </a:schemeClr>
+          </a:solidFill>
+        </p:spPr>
+        <p:style>
+          <a:lnRef idx="2">
+            <a:schemeClr val="accent1">
+              <a:shade val="50000"/>
+            </a:schemeClr>
+          </a:lnRef>
+          <a:fillRef idx="1">
+            <a:schemeClr val="accent1"/>
+          </a:fillRef>
+          <a:effectRef idx="0">
+            <a:schemeClr val="accent1"/>
+          </a:effectRef>
+          <a:fontRef idx="minor">
+            <a:schemeClr val="lt1"/>
+          </a:fontRef>
+        </p:style>
+        <p:txBody>
+          <a:bodyPr rtlCol="0" anchor="ctr"/>
+          <a:lstStyle/>
+          <a:p>
+            <a:pPr algn="ctr"/>
+            <a:r>
+              <a:rPr lang="de-AT" dirty="0" err="1" smtClean="0"/>
+              <a:t>Get</a:t>
+            </a:r>
+            <a:r>
+              <a:rPr lang="de-AT" dirty="0" smtClean="0"/>
+              <a:t> </a:t>
+            </a:r>
+            <a:r>
+              <a:rPr lang="de-AT" dirty="0" err="1" smtClean="0"/>
+              <a:t>data</a:t>
+            </a:r>
+            <a:r>
+              <a:rPr lang="de-AT" dirty="0" smtClean="0"/>
+              <a:t> </a:t>
+            </a:r>
+            <a:r>
+              <a:rPr lang="de-AT" dirty="0" err="1" smtClean="0"/>
+              <a:t>for</a:t>
+            </a:r>
+            <a:r>
+              <a:rPr lang="de-AT" dirty="0" smtClean="0"/>
+              <a:t> </a:t>
+            </a:r>
+            <a:r>
+              <a:rPr lang="de-AT" dirty="0" err="1" smtClean="0"/>
+              <a:t>template</a:t>
+            </a:r>
+            <a:endParaRPr lang="de-AT" dirty="0" smtClean="0"/>
+          </a:p>
+          <a:p>
+            <a:pPr algn="ctr"/>
+            <a:r>
+              <a:rPr lang="de-AT" dirty="0" smtClean="0"/>
+              <a:t>IO </a:t>
+            </a:r>
+            <a:r>
+              <a:rPr lang="de-AT" dirty="0" err="1" smtClean="0"/>
+              <a:t>bounded</a:t>
+            </a:r>
+            <a:endParaRPr lang="en-GB" dirty="0"/>
+          </a:p>
+        </p:txBody>
+      </p:sp>
+      <p:sp>
+        <p:nvSpPr>
+          <p:cNvPr id="8" name="Rectangle 7"/>
+          <p:cNvSpPr/>
+          <p:nvPr/>
+        </p:nvSpPr>
+        <p:spPr>
+          <a:xfrm>
+            <a:off x="6096000" y="4276437"/>
+            <a:ext cx="1796995" cy="914400"/>
+          </a:xfrm>
+          <a:prstGeom prst="rect">
+            <a:avLst/>
+          </a:prstGeom>
+        </p:spPr>
+        <p:style>
+          <a:lnRef idx="2">
+            <a:schemeClr val="accent1">
+              <a:shade val="50000"/>
+            </a:schemeClr>
+          </a:lnRef>
+          <a:fillRef idx="1">
+            <a:schemeClr val="accent1"/>
+          </a:fillRef>
+          <a:effectRef idx="0">
+            <a:schemeClr val="accent1"/>
+          </a:effectRef>
+          <a:fontRef idx="minor">
+            <a:schemeClr val="lt1"/>
+          </a:fontRef>
+        </p:style>
+        <p:txBody>
+          <a:bodyPr rtlCol="0" anchor="ctr"/>
+          <a:lstStyle/>
+          <a:p>
+            <a:pPr algn="ctr"/>
+            <a:r>
+              <a:rPr lang="de-AT" dirty="0" err="1" smtClean="0"/>
+              <a:t>Render</a:t>
+            </a:r>
+            <a:endParaRPr lang="de-AT" dirty="0" smtClean="0"/>
+          </a:p>
+          <a:p>
+            <a:pPr algn="ctr"/>
+            <a:r>
+              <a:rPr lang="de-AT" dirty="0" smtClean="0"/>
+              <a:t>CPU </a:t>
+            </a:r>
+            <a:r>
+              <a:rPr lang="de-AT" dirty="0" err="1" smtClean="0"/>
+              <a:t>bounded</a:t>
+            </a:r>
+            <a:endParaRPr lang="en-GB" dirty="0"/>
+          </a:p>
+        </p:txBody>
+      </p:sp>
+      <p:sp>
+        <p:nvSpPr>
+          <p:cNvPr id="11" name="Rectangle 10"/>
+          <p:cNvSpPr/>
+          <p:nvPr/>
+        </p:nvSpPr>
+        <p:spPr>
+          <a:xfrm>
+            <a:off x="2846566" y="4711705"/>
+            <a:ext cx="1796995" cy="914400"/>
+          </a:xfrm>
+          <a:prstGeom prst="rect">
+            <a:avLst/>
+          </a:prstGeom>
+        </p:spPr>
+        <p:style>
+          <a:lnRef idx="2">
+            <a:schemeClr val="accent1">
+              <a:shade val="50000"/>
+            </a:schemeClr>
+          </a:lnRef>
+          <a:fillRef idx="1">
+            <a:schemeClr val="accent1"/>
+          </a:fillRef>
+          <a:effectRef idx="0">
+            <a:schemeClr val="accent1"/>
+          </a:effectRef>
+          <a:fontRef idx="minor">
+            <a:schemeClr val="lt1"/>
+          </a:fontRef>
+        </p:style>
+        <p:txBody>
+          <a:bodyPr rtlCol="0" anchor="ctr"/>
+          <a:lstStyle/>
+          <a:p>
+            <a:pPr algn="ctr"/>
+            <a:r>
+              <a:rPr lang="de-AT" dirty="0" smtClean="0"/>
+              <a:t>Stream </a:t>
+            </a:r>
+            <a:r>
+              <a:rPr lang="de-AT" dirty="0" err="1" smtClean="0"/>
+              <a:t>response</a:t>
+            </a:r>
+            <a:endParaRPr lang="de-AT" dirty="0" smtClean="0"/>
+          </a:p>
+          <a:p>
+            <a:pPr algn="ctr"/>
+            <a:r>
+              <a:rPr lang="de-AT" dirty="0" smtClean="0"/>
+              <a:t>IO </a:t>
+            </a:r>
+            <a:r>
+              <a:rPr lang="de-AT" dirty="0" err="1" smtClean="0"/>
+              <a:t>bounded</a:t>
+            </a:r>
+            <a:endParaRPr lang="en-GB" dirty="0"/>
+          </a:p>
+        </p:txBody>
+      </p:sp>
+      <p:sp>
+        <p:nvSpPr>
+          <p:cNvPr id="21" name="Rectangle 20"/>
+          <p:cNvSpPr/>
+          <p:nvPr/>
+        </p:nvSpPr>
+        <p:spPr>
+          <a:xfrm>
+            <a:off x="6349117" y="2426014"/>
+            <a:ext cx="1796995" cy="914400"/>
+          </a:xfrm>
+          <a:prstGeom prst="rect">
+            <a:avLst/>
+          </a:prstGeom>
+        </p:spPr>
+        <p:style>
+          <a:lnRef idx="2">
+            <a:schemeClr val="accent1">
+              <a:shade val="50000"/>
+            </a:schemeClr>
+          </a:lnRef>
+          <a:fillRef idx="1">
+            <a:schemeClr val="accent1"/>
+          </a:fillRef>
+          <a:effectRef idx="0">
+            <a:schemeClr val="accent1"/>
+          </a:effectRef>
+          <a:fontRef idx="minor">
+            <a:schemeClr val="lt1"/>
+          </a:fontRef>
+        </p:style>
+        <p:txBody>
+          <a:bodyPr rtlCol="0" anchor="ctr"/>
+          <a:lstStyle/>
+          <a:p>
+            <a:pPr algn="ctr"/>
+            <a:r>
+              <a:rPr lang="de-AT" dirty="0" smtClean="0"/>
+              <a:t>View</a:t>
+            </a:r>
+          </a:p>
+          <a:p>
+            <a:pPr algn="ctr"/>
+            <a:r>
+              <a:rPr lang="de-AT" dirty="0" smtClean="0"/>
+              <a:t>Organizer</a:t>
+            </a:r>
+            <a:endParaRPr lang="en-GB" dirty="0"/>
+          </a:p>
+        </p:txBody>
+      </p:sp>
+      <p:cxnSp>
+        <p:nvCxnSpPr>
+          <p:cNvPr id="23" name="Straight Arrow Connector 22"/>
+          <p:cNvCxnSpPr/>
+          <p:nvPr/>
+        </p:nvCxnSpPr>
+        <p:spPr>
+          <a:xfrm>
+            <a:off x="4834392" y="2874764"/>
+            <a:ext cx="1407050" cy="1"/>
+          </a:xfrm>
+          <a:prstGeom prst="straightConnector1">
+            <a:avLst/>
+          </a:prstGeom>
+          <a:ln>
+            <a:tailEnd type="triangle"/>
+          </a:ln>
+        </p:spPr>
+        <p:style>
+          <a:lnRef idx="1">
+            <a:schemeClr val="accent1"/>
+          </a:lnRef>
+          <a:fillRef idx="0">
+            <a:schemeClr val="accent1"/>
+          </a:fillRef>
+          <a:effectRef idx="0">
+            <a:schemeClr val="accent1"/>
+          </a:effectRef>
+          <a:fontRef idx="minor">
+            <a:schemeClr val="tx1"/>
+          </a:fontRef>
+        </p:style>
+      </p:cxnSp>
+      <p:cxnSp>
+        <p:nvCxnSpPr>
+          <p:cNvPr id="25" name="Straight Arrow Connector 24"/>
+          <p:cNvCxnSpPr/>
+          <p:nvPr/>
+        </p:nvCxnSpPr>
+        <p:spPr>
+          <a:xfrm flipH="1">
+            <a:off x="4762830" y="4802588"/>
+            <a:ext cx="1270222" cy="366317"/>
+          </a:xfrm>
+          <a:prstGeom prst="straightConnector1">
+            <a:avLst/>
+          </a:prstGeom>
+          <a:ln>
+            <a:tailEnd type="triangle"/>
+          </a:ln>
+        </p:spPr>
+        <p:style>
+          <a:lnRef idx="1">
+            <a:schemeClr val="accent1"/>
+          </a:lnRef>
+          <a:fillRef idx="0">
+            <a:schemeClr val="accent1"/>
+          </a:fillRef>
+          <a:effectRef idx="0">
+            <a:schemeClr val="accent1"/>
+          </a:effectRef>
+          <a:fontRef idx="minor">
+            <a:schemeClr val="tx1"/>
+          </a:fontRef>
+        </p:style>
+      </p:cxnSp>
+      <p:cxnSp>
+        <p:nvCxnSpPr>
+          <p:cNvPr id="27" name="Straight Arrow Connector 26"/>
+          <p:cNvCxnSpPr/>
+          <p:nvPr/>
+        </p:nvCxnSpPr>
+        <p:spPr>
+          <a:xfrm>
+            <a:off x="8276973" y="2941983"/>
+            <a:ext cx="580780" cy="75538"/>
+          </a:xfrm>
+          <a:prstGeom prst="straightConnector1">
+            <a:avLst/>
+          </a:prstGeom>
+          <a:ln>
+            <a:headEnd type="triangle"/>
+            <a:tailEnd type="triangle"/>
+          </a:ln>
+        </p:spPr>
+        <p:style>
+          <a:lnRef idx="1">
+            <a:schemeClr val="accent1"/>
+          </a:lnRef>
+          <a:fillRef idx="0">
+            <a:schemeClr val="accent1"/>
+          </a:fillRef>
+          <a:effectRef idx="0">
+            <a:schemeClr val="accent1"/>
+          </a:effectRef>
+          <a:fontRef idx="minor">
+            <a:schemeClr val="tx1"/>
+          </a:fontRef>
+        </p:style>
+      </p:cxnSp>
+      <p:cxnSp>
+        <p:nvCxnSpPr>
+          <p:cNvPr id="29" name="Straight Arrow Connector 28"/>
+          <p:cNvCxnSpPr/>
+          <p:nvPr/>
+        </p:nvCxnSpPr>
+        <p:spPr>
+          <a:xfrm>
+            <a:off x="8276973" y="3132837"/>
+            <a:ext cx="580780" cy="1143600"/>
+          </a:xfrm>
+          <a:prstGeom prst="straightConnector1">
+            <a:avLst/>
+          </a:prstGeom>
+          <a:ln>
+            <a:headEnd type="triangle"/>
+            <a:tailEnd type="triangle"/>
+          </a:ln>
+        </p:spPr>
+        <p:style>
+          <a:lnRef idx="1">
+            <a:schemeClr val="accent1"/>
+          </a:lnRef>
+          <a:fillRef idx="0">
+            <a:schemeClr val="accent1"/>
+          </a:fillRef>
+          <a:effectRef idx="0">
+            <a:schemeClr val="accent1"/>
+          </a:effectRef>
+          <a:fontRef idx="minor">
+            <a:schemeClr val="tx1"/>
+          </a:fontRef>
+        </p:style>
+      </p:cxnSp>
+      <p:cxnSp>
+        <p:nvCxnSpPr>
+          <p:cNvPr id="41" name="Straight Arrow Connector 40"/>
+          <p:cNvCxnSpPr/>
+          <p:nvPr/>
+        </p:nvCxnSpPr>
+        <p:spPr>
+          <a:xfrm flipH="1">
+            <a:off x="7124369" y="3466270"/>
+            <a:ext cx="134838" cy="684311"/>
+          </a:xfrm>
+          <a:prstGeom prst="straightConnector1">
+            <a:avLst/>
+          </a:prstGeom>
+          <a:ln>
+            <a:tailEnd type="triangle"/>
+          </a:ln>
+        </p:spPr>
+        <p:style>
+          <a:lnRef idx="1">
+            <a:schemeClr val="accent1"/>
+          </a:lnRef>
+          <a:fillRef idx="0">
+            <a:schemeClr val="accent1"/>
+          </a:fillRef>
+          <a:effectRef idx="0">
+            <a:schemeClr val="accent1"/>
+          </a:effectRef>
+          <a:fontRef idx="minor">
+            <a:schemeClr val="tx1"/>
+          </a:fontRef>
+        </p:style>
+      </p:cxnSp>
+      <p:sp>
+        <p:nvSpPr>
+          <p:cNvPr id="44" name="Rectangle 43"/>
+          <p:cNvSpPr/>
+          <p:nvPr/>
+        </p:nvSpPr>
+        <p:spPr>
+          <a:xfrm>
+            <a:off x="8567363" y="2075290"/>
+            <a:ext cx="2580366" cy="3275938"/>
+          </a:xfrm>
+          <a:prstGeom prst="rect">
+            <a:avLst/>
+          </a:prstGeom>
+          <a:noFill/>
+        </p:spPr>
+        <p:style>
+          <a:lnRef idx="2">
+            <a:schemeClr val="accent1">
+              <a:shade val="50000"/>
+            </a:schemeClr>
+          </a:lnRef>
+          <a:fillRef idx="1">
+            <a:schemeClr val="accent1"/>
+          </a:fillRef>
+          <a:effectRef idx="0">
+            <a:schemeClr val="accent1"/>
+          </a:effectRef>
+          <a:fontRef idx="minor">
+            <a:schemeClr val="lt1"/>
+          </a:fontRef>
+        </p:style>
+        <p:txBody>
+          <a:bodyPr rtlCol="0" anchor="ctr"/>
+          <a:lstStyle/>
+          <a:p>
+            <a:pPr algn="ctr"/>
+            <a:endParaRPr lang="en-GB"/>
+          </a:p>
+        </p:txBody>
+      </p:sp>
+      <p:sp>
+        <p:nvSpPr>
+          <p:cNvPr id="45" name="Rectangle 44"/>
+          <p:cNvSpPr/>
+          <p:nvPr/>
+        </p:nvSpPr>
+        <p:spPr>
+          <a:xfrm>
+            <a:off x="2297927" y="1979875"/>
+            <a:ext cx="8992925" cy="3959749"/>
+          </a:xfrm>
+          <a:prstGeom prst="rect">
+            <a:avLst/>
+          </a:prstGeom>
+          <a:noFill/>
+        </p:spPr>
+        <p:style>
+          <a:lnRef idx="2">
+            <a:schemeClr val="accent1">
+              <a:shade val="50000"/>
+            </a:schemeClr>
+          </a:lnRef>
+          <a:fillRef idx="1">
+            <a:schemeClr val="accent1"/>
+          </a:fillRef>
+          <a:effectRef idx="0">
+            <a:schemeClr val="accent1"/>
+          </a:effectRef>
+          <a:fontRef idx="minor">
+            <a:schemeClr val="lt1"/>
+          </a:fontRef>
+        </p:style>
+        <p:txBody>
+          <a:bodyPr rtlCol="0" anchor="ctr"/>
+          <a:lstStyle/>
+          <a:p>
+            <a:pPr algn="ctr"/>
+            <a:endParaRPr lang="en-GB"/>
+          </a:p>
+        </p:txBody>
+      </p:sp>
+      <p:sp>
+        <p:nvSpPr>
+          <p:cNvPr id="48" name="Rectangle 47"/>
+          <p:cNvSpPr/>
+          <p:nvPr/>
+        </p:nvSpPr>
+        <p:spPr>
+          <a:xfrm>
+            <a:off x="265790" y="3466270"/>
+            <a:ext cx="1796995" cy="914400"/>
+          </a:xfrm>
+          <a:prstGeom prst="rect">
+            <a:avLst/>
+          </a:prstGeom>
+        </p:spPr>
+        <p:style>
+          <a:lnRef idx="2">
+            <a:schemeClr val="accent1">
+              <a:shade val="50000"/>
+            </a:schemeClr>
+          </a:lnRef>
+          <a:fillRef idx="1">
+            <a:schemeClr val="accent1"/>
+          </a:fillRef>
+          <a:effectRef idx="0">
+            <a:schemeClr val="accent1"/>
+          </a:effectRef>
+          <a:fontRef idx="minor">
+            <a:schemeClr val="lt1"/>
+          </a:fontRef>
+        </p:style>
+        <p:txBody>
+          <a:bodyPr rtlCol="0" anchor="ctr"/>
+          <a:lstStyle/>
+          <a:p>
+            <a:pPr algn="ctr"/>
+            <a:r>
+              <a:rPr lang="de-AT" dirty="0" smtClean="0"/>
+              <a:t>Client</a:t>
+            </a:r>
+            <a:endParaRPr lang="en-GB" dirty="0"/>
+          </a:p>
+        </p:txBody>
+      </p:sp>
+    </p:spTree>
+    <p:extLst>
+      <p:ext uri="{BB962C8B-B14F-4D97-AF65-F5344CB8AC3E}">
+        <p14:creationId xmlns:p14="http://schemas.microsoft.com/office/powerpoint/2010/main" val="913450204"/>
+      </p:ext>
+    </p:extLst>
+  </p:cSld>
+  <p:clrMapOvr>
+    <a:masterClrMapping/>
+  </p:clrMapOvr>
+</p:sld>
+</file>
+
+<file path=ppt/slides/slide14.xml><?xml version="1.0" encoding="utf-8"?>
+<p:sld xmlns:a="http://schemas.openxmlformats.org/drawingml/2006/main" xmlns:r="http://schemas.openxmlformats.org/officeDocument/2006/relationships" xmlns:p="http://schemas.openxmlformats.org/presentationml/2006/main">
+  <p:cSld>
+    <p:spTree>
+      <p:nvGrpSpPr>
+        <p:cNvPr id="1" name=""/>
+        <p:cNvGrpSpPr/>
+        <p:nvPr/>
+      </p:nvGrpSpPr>
+      <p:grpSpPr>
+        <a:xfrm>
+          <a:off x="0" y="0"/>
+          <a:ext cx="0" cy="0"/>
+          <a:chOff x="0" y="0"/>
+          <a:chExt cx="0" cy="0"/>
+        </a:xfrm>
+      </p:grpSpPr>
+      <p:sp>
+        <p:nvSpPr>
+          <p:cNvPr id="2" name="Title 1"/>
+          <p:cNvSpPr>
+            <a:spLocks noGrp="1"/>
+          </p:cNvSpPr>
+          <p:nvPr>
+            <p:ph type="title"/>
+          </p:nvPr>
+        </p:nvSpPr>
+        <p:spPr/>
+        <p:txBody>
+          <a:bodyPr/>
+          <a:lstStyle/>
+          <a:p>
+            <a:r>
+              <a:rPr lang="en-GB" dirty="0" smtClean="0"/>
+              <a:t>Micro service read, </a:t>
+            </a:r>
+            <a:r>
+              <a:rPr lang="de-AT" dirty="0" err="1" smtClean="0"/>
+              <a:t>render</a:t>
+            </a:r>
+            <a:r>
+              <a:rPr lang="de-AT" dirty="0" smtClean="0"/>
+              <a:t> </a:t>
+            </a:r>
+            <a:r>
+              <a:rPr lang="en-GB" dirty="0" smtClean="0"/>
+              <a:t>and </a:t>
+            </a:r>
+            <a:r>
+              <a:rPr lang="en-GB" dirty="0" smtClean="0"/>
+              <a:t>send answer</a:t>
+            </a:r>
+            <a:endParaRPr lang="en-GB" dirty="0"/>
+          </a:p>
+        </p:txBody>
+      </p:sp>
+      <p:sp>
+        <p:nvSpPr>
+          <p:cNvPr id="3" name="Content Placeholder 2"/>
+          <p:cNvSpPr>
+            <a:spLocks noGrp="1"/>
+          </p:cNvSpPr>
+          <p:nvPr>
+            <p:ph idx="1"/>
+          </p:nvPr>
+        </p:nvSpPr>
+        <p:spPr/>
+        <p:txBody>
+          <a:bodyPr/>
+          <a:lstStyle/>
+          <a:p>
+            <a:r>
+              <a:rPr lang="en-GB" dirty="0"/>
+              <a:t>python </a:t>
+            </a:r>
+            <a:r>
+              <a:rPr lang="en-GB" dirty="0" smtClean="0"/>
+              <a:t>3_syncfile.py </a:t>
+            </a:r>
+            <a:r>
+              <a:rPr lang="en-GB" dirty="0"/>
+              <a:t>hello world - </a:t>
+            </a:r>
+            <a:r>
+              <a:rPr lang="en-GB" dirty="0" smtClean="0"/>
+              <a:t>~60rps</a:t>
+            </a:r>
+            <a:endParaRPr lang="en-GB" dirty="0"/>
+          </a:p>
+          <a:p>
+            <a:endParaRPr lang="en-GB" dirty="0"/>
+          </a:p>
+          <a:p>
+            <a:r>
+              <a:rPr lang="en-GB" dirty="0"/>
+              <a:t>python </a:t>
+            </a:r>
+            <a:r>
+              <a:rPr lang="en-GB" dirty="0" smtClean="0"/>
+              <a:t>3_aiohttp_server.py hello world - </a:t>
+            </a:r>
+            <a:r>
+              <a:rPr lang="en-GB" dirty="0" smtClean="0"/>
+              <a:t>~250rps</a:t>
+            </a:r>
+            <a:endParaRPr lang="en-GB" dirty="0"/>
+          </a:p>
+          <a:p>
+            <a:pPr marL="0" indent="0">
+              <a:buNone/>
+            </a:pPr>
+            <a:endParaRPr lang="en-GB" dirty="0"/>
+          </a:p>
+          <a:p>
+            <a:r>
+              <a:rPr lang="en-GB" dirty="0" smtClean="0"/>
+              <a:t>python 3_curio_server.py </a:t>
+            </a:r>
+            <a:r>
+              <a:rPr lang="en-GB" dirty="0"/>
+              <a:t>hello world </a:t>
+            </a:r>
+            <a:r>
+              <a:rPr lang="en-GB"/>
+              <a:t>- </a:t>
+            </a:r>
+            <a:r>
+              <a:rPr lang="en-GB" smtClean="0"/>
+              <a:t>~270rps</a:t>
+            </a:r>
+            <a:endParaRPr lang="en-GB" dirty="0"/>
+          </a:p>
+          <a:p>
+            <a:pPr marL="0" indent="0">
+              <a:buNone/>
+            </a:pPr>
+            <a:endParaRPr lang="en-GB" dirty="0" smtClean="0"/>
+          </a:p>
+          <a:p>
+            <a:endParaRPr lang="en-GB" dirty="0"/>
+          </a:p>
+        </p:txBody>
+      </p:sp>
+    </p:spTree>
+    <p:extLst>
+      <p:ext uri="{BB962C8B-B14F-4D97-AF65-F5344CB8AC3E}">
+        <p14:creationId xmlns:p14="http://schemas.microsoft.com/office/powerpoint/2010/main" val="2412529721"/>
       </p:ext>
     </p:extLst>
   </p:cSld>

</xml_diff>